<commit_message>
Interview Analysis charts created in ppt
</commit_message>
<xml_diff>
--- a/Analysis/Interview Analysis Report.pptx
+++ b/Analysis/Interview Analysis Report.pptx
@@ -192,11 +192,11 @@
           <c:showBubbleSize val="0"/>
         </c:dLbls>
         <c:gapWidth val="150"/>
-        <c:axId val="38007552"/>
-        <c:axId val="38009856"/>
+        <c:axId val="84594688"/>
+        <c:axId val="84596224"/>
       </c:barChart>
       <c:catAx>
-        <c:axId val="38007552"/>
+        <c:axId val="84594688"/>
         <c:scaling>
           <c:orientation val="minMax"/>
         </c:scaling>
@@ -205,7 +205,7 @@
         <c:majorTickMark val="none"/>
         <c:minorTickMark val="none"/>
         <c:tickLblPos val="nextTo"/>
-        <c:crossAx val="38009856"/>
+        <c:crossAx val="84596224"/>
         <c:crosses val="autoZero"/>
         <c:auto val="1"/>
         <c:lblAlgn val="ctr"/>
@@ -213,7 +213,7 @@
         <c:noMultiLvlLbl val="0"/>
       </c:catAx>
       <c:valAx>
-        <c:axId val="38009856"/>
+        <c:axId val="84596224"/>
         <c:scaling>
           <c:orientation val="minMax"/>
           <c:max val="8"/>
@@ -225,7 +225,7 @@
         <c:majorTickMark val="none"/>
         <c:minorTickMark val="none"/>
         <c:tickLblPos val="nextTo"/>
-        <c:crossAx val="38007552"/>
+        <c:crossAx val="84594688"/>
         <c:crosses val="autoZero"/>
         <c:crossBetween val="between"/>
         <c:majorUnit val="2"/>
@@ -341,11 +341,11 @@
           <c:showBubbleSize val="0"/>
         </c:dLbls>
         <c:gapWidth val="150"/>
-        <c:axId val="39502976"/>
-        <c:axId val="40805504"/>
+        <c:axId val="91493504"/>
+        <c:axId val="91495040"/>
       </c:barChart>
       <c:catAx>
-        <c:axId val="39502976"/>
+        <c:axId val="91493504"/>
         <c:scaling>
           <c:orientation val="minMax"/>
         </c:scaling>
@@ -354,7 +354,7 @@
         <c:majorTickMark val="none"/>
         <c:minorTickMark val="none"/>
         <c:tickLblPos val="nextTo"/>
-        <c:crossAx val="40805504"/>
+        <c:crossAx val="91495040"/>
         <c:crosses val="autoZero"/>
         <c:auto val="1"/>
         <c:lblAlgn val="ctr"/>
@@ -362,7 +362,7 @@
         <c:noMultiLvlLbl val="0"/>
       </c:catAx>
       <c:valAx>
-        <c:axId val="40805504"/>
+        <c:axId val="91495040"/>
         <c:scaling>
           <c:orientation val="minMax"/>
           <c:max val="8"/>
@@ -374,7 +374,7 @@
         <c:majorTickMark val="none"/>
         <c:minorTickMark val="none"/>
         <c:tickLblPos val="nextTo"/>
-        <c:crossAx val="39502976"/>
+        <c:crossAx val="91493504"/>
         <c:crosses val="autoZero"/>
         <c:crossBetween val="between"/>
       </c:valAx>
@@ -489,11 +489,11 @@
           <c:showBubbleSize val="0"/>
         </c:dLbls>
         <c:gapWidth val="150"/>
-        <c:axId val="40804736"/>
-        <c:axId val="40818560"/>
+        <c:axId val="41751680"/>
+        <c:axId val="41753216"/>
       </c:barChart>
       <c:catAx>
-        <c:axId val="40804736"/>
+        <c:axId val="41751680"/>
         <c:scaling>
           <c:orientation val="minMax"/>
         </c:scaling>
@@ -502,7 +502,7 @@
         <c:majorTickMark val="out"/>
         <c:minorTickMark val="none"/>
         <c:tickLblPos val="nextTo"/>
-        <c:crossAx val="40818560"/>
+        <c:crossAx val="41753216"/>
         <c:crosses val="autoZero"/>
         <c:auto val="1"/>
         <c:lblAlgn val="ctr"/>
@@ -510,7 +510,7 @@
         <c:noMultiLvlLbl val="0"/>
       </c:catAx>
       <c:valAx>
-        <c:axId val="40818560"/>
+        <c:axId val="41753216"/>
         <c:scaling>
           <c:orientation val="minMax"/>
         </c:scaling>
@@ -521,7 +521,7 @@
         <c:majorTickMark val="out"/>
         <c:minorTickMark val="none"/>
         <c:tickLblPos val="nextTo"/>
-        <c:crossAx val="40804736"/>
+        <c:crossAx val="41751680"/>
         <c:crosses val="autoZero"/>
         <c:crossBetween val="between"/>
       </c:valAx>
@@ -585,7 +585,7 @@
               <c:strCache>
                 <c:ptCount val="1"/>
                 <c:pt idx="0">
-                  <c:v>Series 1</c:v>
+                  <c:v>Delivery Ack/Doc</c:v>
                 </c:pt>
               </c:strCache>
             </c:strRef>
@@ -621,7 +621,7 @@
                   <c:v>1</c:v>
                 </c:pt>
                 <c:pt idx="2">
-                  <c:v>3.5</c:v>
+                  <c:v>4</c:v>
                 </c:pt>
               </c:numCache>
             </c:numRef>
@@ -636,11 +636,11 @@
           <c:showBubbleSize val="0"/>
         </c:dLbls>
         <c:gapWidth val="150"/>
-        <c:axId val="39473920"/>
-        <c:axId val="39475840"/>
+        <c:axId val="41782272"/>
+        <c:axId val="41788160"/>
       </c:barChart>
       <c:catAx>
-        <c:axId val="39473920"/>
+        <c:axId val="41782272"/>
         <c:scaling>
           <c:orientation val="minMax"/>
         </c:scaling>
@@ -649,7 +649,7 @@
         <c:majorTickMark val="out"/>
         <c:minorTickMark val="none"/>
         <c:tickLblPos val="nextTo"/>
-        <c:crossAx val="39475840"/>
+        <c:crossAx val="41788160"/>
         <c:crosses val="autoZero"/>
         <c:auto val="1"/>
         <c:lblAlgn val="ctr"/>
@@ -657,9 +657,10 @@
         <c:noMultiLvlLbl val="0"/>
       </c:catAx>
       <c:valAx>
-        <c:axId val="39475840"/>
+        <c:axId val="41788160"/>
         <c:scaling>
           <c:orientation val="minMax"/>
+          <c:max val="8"/>
         </c:scaling>
         <c:delete val="0"/>
         <c:axPos val="b"/>
@@ -668,9 +669,10 @@
         <c:majorTickMark val="out"/>
         <c:minorTickMark val="none"/>
         <c:tickLblPos val="nextTo"/>
-        <c:crossAx val="39473920"/>
+        <c:crossAx val="41782272"/>
         <c:crosses val="autoZero"/>
         <c:crossBetween val="between"/>
+        <c:majorUnit val="2"/>
       </c:valAx>
     </c:plotArea>
     <c:legend>
@@ -1107,11 +1109,20 @@
           <a:p>
             <a:r>
               <a:rPr lang="en-US" baseline="0" dirty="0" smtClean="0"/>
-              <a:t>In stock management, it is found that many stored are using a software to maintain there stocks. But since due to the gap in purchase management, there is a lot of manual  work carried in order to maintain the stocks. Because the purchased stocks have to manually updated into the </a:t>
-            </a:r>
-            <a:r>
-              <a:rPr lang="en-US" baseline="0" smtClean="0"/>
-              <a:t>system.</a:t>
+              <a:t>In stock management, it is found that many stored are using a software to maintain there stocks. But since due to the gap in purchase management, there is a lot of manual  work carried in order to maintain the stocks. Because the purchased stocks have to manually updated into the system</a:t>
+            </a:r>
+            <a:r>
+              <a:rPr lang="en-US" baseline="0" dirty="0" smtClean="0"/>
+              <a:t>.</a:t>
+            </a:r>
+          </a:p>
+          <a:p>
+            <a:endParaRPr lang="en-US" baseline="0" dirty="0" smtClean="0"/>
+          </a:p>
+          <a:p>
+            <a:r>
+              <a:rPr lang="en-US" baseline="0" dirty="0" smtClean="0"/>
+              <a:t>In delivery Acknowledgement/Documentation, it shows like half of the people are using a paper and excel based documentation.</a:t>
             </a:r>
             <a:endParaRPr lang="en-US" baseline="0" dirty="0" smtClean="0"/>
           </a:p>
@@ -4391,7 +4402,7 @@
           <p:nvPr>
             <p:extLst>
               <p:ext uri="{D42A27DB-BD31-4B8C-83A1-F6EECF244321}">
-                <p14:modId xmlns:p14="http://schemas.microsoft.com/office/powerpoint/2010/main" val="2196458566"/>
+                <p14:modId xmlns:p14="http://schemas.microsoft.com/office/powerpoint/2010/main" val="1033281151"/>
               </p:ext>
             </p:extLst>
           </p:nvPr>

</xml_diff>

<commit_message>
Added UI-Generate_Bill&View_Bill and  Rectified analysis report
</commit_message>
<xml_diff>
--- a/Analysis/Interview Analysis Report.pptx
+++ b/Analysis/Interview Analysis Report.pptx
@@ -115,29 +115,17 @@
 
 <file path=ppt/charts/chart1.xml><?xml version="1.0" encoding="utf-8"?>
 <c:chartSpace xmlns:c="http://schemas.openxmlformats.org/drawingml/2006/chart" xmlns:a="http://schemas.openxmlformats.org/drawingml/2006/main" xmlns:r="http://schemas.openxmlformats.org/officeDocument/2006/relationships">
-  <c:date1904 val="0"/>
+  <c:date1904 val="1"/>
   <c:lang val="en-US"/>
-  <c:roundedCorners val="0"/>
-  <mc:AlternateContent xmlns:mc="http://schemas.openxmlformats.org/markup-compatibility/2006">
-    <mc:Choice xmlns:c14="http://schemas.microsoft.com/office/drawing/2007/8/2/chart" Requires="c14">
-      <c14:style val="102"/>
-    </mc:Choice>
-    <mc:Fallback>
-      <c:style val="2"/>
-    </mc:Fallback>
-  </mc:AlternateContent>
   <c:chart>
     <c:title>
       <c:layout/>
-      <c:overlay val="0"/>
     </c:title>
-    <c:autoTitleDeleted val="0"/>
     <c:plotArea>
       <c:layout/>
       <c:barChart>
         <c:barDir val="bar"/>
         <c:grouping val="clustered"/>
-        <c:varyColors val="0"/>
         <c:ser>
           <c:idx val="0"/>
           <c:order val="0"/>
@@ -152,7 +140,6 @@
               </c:strCache>
             </c:strRef>
           </c:tx>
-          <c:invertIfNegative val="0"/>
           <c:cat>
             <c:strRef>
               <c:f>Sheet1!$A$2:$A$5</c:f>
@@ -183,49 +170,35 @@
             </c:numRef>
           </c:val>
         </c:ser>
-        <c:dLbls>
-          <c:showLegendKey val="0"/>
-          <c:showVal val="0"/>
-          <c:showCatName val="0"/>
-          <c:showSerName val="0"/>
-          <c:showPercent val="0"/>
-          <c:showBubbleSize val="0"/>
-        </c:dLbls>
-        <c:gapWidth val="150"/>
-        <c:axId val="38007552"/>
-        <c:axId val="38009856"/>
+        <c:axId val="80092160"/>
+        <c:axId val="80196352"/>
       </c:barChart>
       <c:catAx>
-        <c:axId val="38007552"/>
+        <c:axId val="80092160"/>
         <c:scaling>
           <c:orientation val="minMax"/>
         </c:scaling>
-        <c:delete val="0"/>
         <c:axPos val="l"/>
         <c:majorTickMark val="none"/>
-        <c:minorTickMark val="none"/>
         <c:tickLblPos val="nextTo"/>
-        <c:crossAx val="38009856"/>
+        <c:crossAx val="80196352"/>
         <c:crosses val="autoZero"/>
         <c:auto val="1"/>
         <c:lblAlgn val="ctr"/>
         <c:lblOffset val="100"/>
-        <c:noMultiLvlLbl val="0"/>
       </c:catAx>
       <c:valAx>
-        <c:axId val="38009856"/>
+        <c:axId val="80196352"/>
         <c:scaling>
           <c:orientation val="minMax"/>
           <c:max val="8"/>
         </c:scaling>
-        <c:delete val="0"/>
         <c:axPos val="b"/>
         <c:majorGridlines/>
         <c:numFmt formatCode="General" sourceLinked="1"/>
         <c:majorTickMark val="none"/>
-        <c:minorTickMark val="none"/>
         <c:tickLblPos val="nextTo"/>
-        <c:crossAx val="38007552"/>
+        <c:crossAx val="80092160"/>
         <c:crosses val="autoZero"/>
         <c:crossBetween val="between"/>
         <c:majorUnit val="2"/>
@@ -234,11 +207,9 @@
     <c:legend>
       <c:legendPos val="r"/>
       <c:layout/>
-      <c:overlay val="0"/>
     </c:legend>
     <c:plotVisOnly val="1"/>
     <c:dispBlanksAs val="gap"/>
-    <c:showDLblsOverMax val="0"/>
   </c:chart>
   <c:txPr>
     <a:bodyPr/>
@@ -250,37 +221,22 @@
       <a:endParaRPr lang="en-US"/>
     </a:p>
   </c:txPr>
-  <c:externalData r:id="rId1">
-    <c:autoUpdate val="0"/>
-  </c:externalData>
+  <c:externalData r:id="rId1"/>
 </c:chartSpace>
 </file>
 
 <file path=ppt/charts/chart2.xml><?xml version="1.0" encoding="utf-8"?>
 <c:chartSpace xmlns:c="http://schemas.openxmlformats.org/drawingml/2006/chart" xmlns:a="http://schemas.openxmlformats.org/drawingml/2006/main" xmlns:r="http://schemas.openxmlformats.org/officeDocument/2006/relationships">
-  <c:date1904 val="0"/>
   <c:lang val="en-US"/>
-  <c:roundedCorners val="0"/>
-  <mc:AlternateContent xmlns:mc="http://schemas.openxmlformats.org/markup-compatibility/2006">
-    <mc:Choice xmlns:c14="http://schemas.microsoft.com/office/drawing/2007/8/2/chart" Requires="c14">
-      <c14:style val="102"/>
-    </mc:Choice>
-    <mc:Fallback>
-      <c:style val="2"/>
-    </mc:Fallback>
-  </mc:AlternateContent>
   <c:chart>
     <c:title>
       <c:layout/>
-      <c:overlay val="0"/>
     </c:title>
-    <c:autoTitleDeleted val="0"/>
     <c:plotArea>
       <c:layout/>
       <c:barChart>
         <c:barDir val="bar"/>
         <c:grouping val="clustered"/>
-        <c:varyColors val="0"/>
         <c:ser>
           <c:idx val="0"/>
           <c:order val="0"/>
@@ -295,7 +251,6 @@
               </c:strCache>
             </c:strRef>
           </c:tx>
-          <c:invertIfNegative val="0"/>
           <c:cat>
             <c:strRef>
               <c:f>Sheet1!$A$2:$A$5</c:f>
@@ -326,55 +281,41 @@
                   <c:v>3</c:v>
                 </c:pt>
                 <c:pt idx="2">
-                  <c:v>3</c:v>
+                  <c:v>4</c:v>
                 </c:pt>
               </c:numCache>
             </c:numRef>
           </c:val>
         </c:ser>
-        <c:dLbls>
-          <c:showLegendKey val="0"/>
-          <c:showVal val="0"/>
-          <c:showCatName val="0"/>
-          <c:showSerName val="0"/>
-          <c:showPercent val="0"/>
-          <c:showBubbleSize val="0"/>
-        </c:dLbls>
-        <c:gapWidth val="150"/>
-        <c:axId val="39502976"/>
-        <c:axId val="40805504"/>
+        <c:axId val="99897344"/>
+        <c:axId val="99898880"/>
       </c:barChart>
       <c:catAx>
-        <c:axId val="39502976"/>
+        <c:axId val="99897344"/>
         <c:scaling>
           <c:orientation val="minMax"/>
         </c:scaling>
-        <c:delete val="0"/>
         <c:axPos val="l"/>
         <c:majorTickMark val="none"/>
-        <c:minorTickMark val="none"/>
         <c:tickLblPos val="nextTo"/>
-        <c:crossAx val="40805504"/>
+        <c:crossAx val="99898880"/>
         <c:crosses val="autoZero"/>
         <c:auto val="1"/>
         <c:lblAlgn val="ctr"/>
         <c:lblOffset val="100"/>
-        <c:noMultiLvlLbl val="0"/>
       </c:catAx>
       <c:valAx>
-        <c:axId val="40805504"/>
+        <c:axId val="99898880"/>
         <c:scaling>
           <c:orientation val="minMax"/>
           <c:max val="8"/>
         </c:scaling>
-        <c:delete val="0"/>
         <c:axPos val="b"/>
         <c:majorGridlines/>
         <c:numFmt formatCode="General" sourceLinked="1"/>
         <c:majorTickMark val="none"/>
-        <c:minorTickMark val="none"/>
         <c:tickLblPos val="nextTo"/>
-        <c:crossAx val="39502976"/>
+        <c:crossAx val="99897344"/>
         <c:crosses val="autoZero"/>
         <c:crossBetween val="between"/>
       </c:valAx>
@@ -382,11 +323,9 @@
     <c:legend>
       <c:legendPos val="r"/>
       <c:layout/>
-      <c:overlay val="0"/>
     </c:legend>
     <c:plotVisOnly val="1"/>
     <c:dispBlanksAs val="gap"/>
-    <c:showDLblsOverMax val="0"/>
   </c:chart>
   <c:txPr>
     <a:bodyPr/>
@@ -398,37 +337,23 @@
       <a:endParaRPr lang="en-US"/>
     </a:p>
   </c:txPr>
-  <c:externalData r:id="rId1">
-    <c:autoUpdate val="0"/>
-  </c:externalData>
+  <c:externalData r:id="rId1"/>
 </c:chartSpace>
 </file>
 
 <file path=ppt/charts/chart3.xml><?xml version="1.0" encoding="utf-8"?>
 <c:chartSpace xmlns:c="http://schemas.openxmlformats.org/drawingml/2006/chart" xmlns:a="http://schemas.openxmlformats.org/drawingml/2006/main" xmlns:r="http://schemas.openxmlformats.org/officeDocument/2006/relationships">
-  <c:date1904 val="0"/>
+  <c:date1904 val="1"/>
   <c:lang val="en-US"/>
-  <c:roundedCorners val="0"/>
-  <mc:AlternateContent xmlns:mc="http://schemas.openxmlformats.org/markup-compatibility/2006">
-    <mc:Choice xmlns:c14="http://schemas.microsoft.com/office/drawing/2007/8/2/chart" Requires="c14">
-      <c14:style val="102"/>
-    </mc:Choice>
-    <mc:Fallback>
-      <c:style val="2"/>
-    </mc:Fallback>
-  </mc:AlternateContent>
   <c:chart>
     <c:title>
       <c:layout/>
-      <c:overlay val="0"/>
     </c:title>
-    <c:autoTitleDeleted val="0"/>
     <c:plotArea>
       <c:layout/>
       <c:barChart>
         <c:barDir val="bar"/>
         <c:grouping val="clustered"/>
-        <c:varyColors val="0"/>
         <c:ser>
           <c:idx val="0"/>
           <c:order val="0"/>
@@ -443,7 +368,6 @@
               </c:strCache>
             </c:strRef>
           </c:tx>
-          <c:invertIfNegative val="0"/>
           <c:cat>
             <c:strRef>
               <c:f>Sheet1!$A$2:$A$5</c:f>
@@ -480,48 +404,32 @@
             </c:numRef>
           </c:val>
         </c:ser>
-        <c:dLbls>
-          <c:showLegendKey val="0"/>
-          <c:showVal val="0"/>
-          <c:showCatName val="0"/>
-          <c:showSerName val="0"/>
-          <c:showPercent val="0"/>
-          <c:showBubbleSize val="0"/>
-        </c:dLbls>
-        <c:gapWidth val="150"/>
-        <c:axId val="40804736"/>
-        <c:axId val="40818560"/>
+        <c:axId val="99977088"/>
+        <c:axId val="99978624"/>
       </c:barChart>
       <c:catAx>
-        <c:axId val="40804736"/>
+        <c:axId val="99977088"/>
         <c:scaling>
           <c:orientation val="minMax"/>
         </c:scaling>
-        <c:delete val="0"/>
         <c:axPos val="l"/>
-        <c:majorTickMark val="out"/>
-        <c:minorTickMark val="none"/>
         <c:tickLblPos val="nextTo"/>
-        <c:crossAx val="40818560"/>
+        <c:crossAx val="99978624"/>
         <c:crosses val="autoZero"/>
         <c:auto val="1"/>
         <c:lblAlgn val="ctr"/>
         <c:lblOffset val="100"/>
-        <c:noMultiLvlLbl val="0"/>
       </c:catAx>
       <c:valAx>
-        <c:axId val="40818560"/>
+        <c:axId val="99978624"/>
         <c:scaling>
           <c:orientation val="minMax"/>
         </c:scaling>
-        <c:delete val="0"/>
         <c:axPos val="b"/>
         <c:majorGridlines/>
         <c:numFmt formatCode="General" sourceLinked="1"/>
-        <c:majorTickMark val="out"/>
-        <c:minorTickMark val="none"/>
         <c:tickLblPos val="nextTo"/>
-        <c:crossAx val="40804736"/>
+        <c:crossAx val="99977088"/>
         <c:crosses val="autoZero"/>
         <c:crossBetween val="between"/>
       </c:valAx>
@@ -529,11 +437,9 @@
     <c:legend>
       <c:legendPos val="r"/>
       <c:layout/>
-      <c:overlay val="0"/>
     </c:legend>
     <c:plotVisOnly val="1"/>
     <c:dispBlanksAs val="gap"/>
-    <c:showDLblsOverMax val="0"/>
   </c:chart>
   <c:txPr>
     <a:bodyPr/>
@@ -545,37 +451,49 @@
       <a:endParaRPr lang="en-US"/>
     </a:p>
   </c:txPr>
-  <c:externalData r:id="rId1">
-    <c:autoUpdate val="0"/>
-  </c:externalData>
+  <c:externalData r:id="rId1"/>
 </c:chartSpace>
 </file>
 
 <file path=ppt/charts/chart4.xml><?xml version="1.0" encoding="utf-8"?>
 <c:chartSpace xmlns:c="http://schemas.openxmlformats.org/drawingml/2006/chart" xmlns:a="http://schemas.openxmlformats.org/drawingml/2006/main" xmlns:r="http://schemas.openxmlformats.org/officeDocument/2006/relationships">
-  <c:date1904 val="0"/>
   <c:lang val="en-US"/>
-  <c:roundedCorners val="0"/>
-  <mc:AlternateContent xmlns:mc="http://schemas.openxmlformats.org/markup-compatibility/2006">
-    <mc:Choice xmlns:c14="http://schemas.microsoft.com/office/drawing/2007/8/2/chart" Requires="c14">
-      <c14:style val="102"/>
-    </mc:Choice>
-    <mc:Fallback>
-      <c:style val="2"/>
-    </mc:Fallback>
-  </mc:AlternateContent>
   <c:chart>
     <c:title>
+      <c:tx>
+        <c:rich>
+          <a:bodyPr/>
+          <a:lstStyle/>
+          <a:p>
+            <a:pPr>
+              <a:defRPr/>
+            </a:pPr>
+            <a:r>
+              <a:rPr lang="en-US" dirty="0" err="1" smtClean="0"/>
+              <a:t>Delevery</a:t>
+            </a:r>
+            <a:r>
+              <a:rPr lang="en-US" dirty="0" smtClean="0"/>
+              <a:t> </a:t>
+            </a:r>
+            <a:r>
+              <a:rPr lang="en-US" dirty="0" err="1" smtClean="0"/>
+              <a:t>ack</a:t>
+            </a:r>
+            <a:r>
+              <a:rPr lang="en-US" dirty="0" smtClean="0"/>
+              <a:t> and doc</a:t>
+            </a:r>
+          </a:p>
+        </c:rich>
+      </c:tx>
       <c:layout/>
-      <c:overlay val="0"/>
     </c:title>
-    <c:autoTitleDeleted val="0"/>
     <c:plotArea>
       <c:layout/>
       <c:barChart>
         <c:barDir val="bar"/>
         <c:grouping val="clustered"/>
-        <c:varyColors val="0"/>
         <c:ser>
           <c:idx val="0"/>
           <c:order val="0"/>
@@ -590,7 +508,6 @@
               </c:strCache>
             </c:strRef>
           </c:tx>
-          <c:invertIfNegative val="0"/>
           <c:cat>
             <c:strRef>
               <c:f>Sheet1!$A$2:$A$5</c:f>
@@ -621,54 +538,38 @@
                   <c:v>1</c:v>
                 </c:pt>
                 <c:pt idx="2">
-                  <c:v>3.5</c:v>
+                  <c:v>4</c:v>
                 </c:pt>
               </c:numCache>
             </c:numRef>
           </c:val>
         </c:ser>
-        <c:dLbls>
-          <c:showLegendKey val="0"/>
-          <c:showVal val="0"/>
-          <c:showCatName val="0"/>
-          <c:showSerName val="0"/>
-          <c:showPercent val="0"/>
-          <c:showBubbleSize val="0"/>
-        </c:dLbls>
-        <c:gapWidth val="150"/>
-        <c:axId val="39473920"/>
-        <c:axId val="39475840"/>
+        <c:axId val="54883456"/>
+        <c:axId val="54884992"/>
       </c:barChart>
       <c:catAx>
-        <c:axId val="39473920"/>
+        <c:axId val="54883456"/>
         <c:scaling>
           <c:orientation val="minMax"/>
         </c:scaling>
-        <c:delete val="0"/>
         <c:axPos val="l"/>
-        <c:majorTickMark val="out"/>
-        <c:minorTickMark val="none"/>
         <c:tickLblPos val="nextTo"/>
-        <c:crossAx val="39475840"/>
+        <c:crossAx val="54884992"/>
         <c:crosses val="autoZero"/>
         <c:auto val="1"/>
         <c:lblAlgn val="ctr"/>
         <c:lblOffset val="100"/>
-        <c:noMultiLvlLbl val="0"/>
       </c:catAx>
       <c:valAx>
-        <c:axId val="39475840"/>
+        <c:axId val="54884992"/>
         <c:scaling>
           <c:orientation val="minMax"/>
         </c:scaling>
-        <c:delete val="0"/>
         <c:axPos val="b"/>
         <c:majorGridlines/>
         <c:numFmt formatCode="General" sourceLinked="1"/>
-        <c:majorTickMark val="out"/>
-        <c:minorTickMark val="none"/>
         <c:tickLblPos val="nextTo"/>
-        <c:crossAx val="39473920"/>
+        <c:crossAx val="54883456"/>
         <c:crosses val="autoZero"/>
         <c:crossBetween val="between"/>
       </c:valAx>
@@ -676,11 +577,9 @@
     <c:legend>
       <c:legendPos val="r"/>
       <c:layout/>
-      <c:overlay val="0"/>
     </c:legend>
     <c:plotVisOnly val="1"/>
     <c:dispBlanksAs val="gap"/>
-    <c:showDLblsOverMax val="0"/>
   </c:chart>
   <c:txPr>
     <a:bodyPr/>
@@ -692,9 +591,7 @@
       <a:endParaRPr lang="en-US"/>
     </a:p>
   </c:txPr>
-  <c:externalData r:id="rId1">
-    <c:autoUpdate val="0"/>
-  </c:externalData>
+  <c:externalData r:id="rId1"/>
 </c:chartSpace>
 </file>
 
@@ -780,7 +677,8 @@
           <a:p>
             <a:fld id="{55064A40-8E2A-4D71-997B-60972F5BF541}" type="datetimeFigureOut">
               <a:rPr lang="en-US" smtClean="0"/>
-              <a:t>5/1/2017</a:t>
+              <a:pPr/>
+              <a:t>5/3/2017</a:t>
             </a:fld>
             <a:endParaRPr lang="en-US"/>
           </a:p>
@@ -939,6 +837,7 @@
           <a:p>
             <a:fld id="{E5A5E837-3E5E-4E9D-994C-F76C4A83F0EF}" type="slidenum">
               <a:rPr lang="en-US" smtClean="0"/>
+              <a:pPr/>
               <a:t>‹#›</a:t>
             </a:fld>
             <a:endParaRPr lang="en-US"/>
@@ -948,7 +847,7 @@
     </p:spTree>
     <p:extLst>
       <p:ext uri="{BB962C8B-B14F-4D97-AF65-F5344CB8AC3E}">
-        <p14:creationId xmlns:p14="http://schemas.microsoft.com/office/powerpoint/2010/main" val="2786159363"/>
+        <p14:creationId xmlns="" xmlns:p14="http://schemas.microsoft.com/office/powerpoint/2010/main" val="2786159363"/>
       </p:ext>
     </p:extLst>
   </p:cSld>
@@ -1134,6 +1033,7 @@
           <a:p>
             <a:fld id="{E5A5E837-3E5E-4E9D-994C-F76C4A83F0EF}" type="slidenum">
               <a:rPr lang="en-US" smtClean="0"/>
+              <a:pPr/>
               <a:t>1</a:t>
             </a:fld>
             <a:endParaRPr lang="en-US"/>
@@ -1143,7 +1043,7 @@
     </p:spTree>
     <p:extLst>
       <p:ext uri="{BB962C8B-B14F-4D97-AF65-F5344CB8AC3E}">
-        <p14:creationId xmlns:p14="http://schemas.microsoft.com/office/powerpoint/2010/main" val="1775200105"/>
+        <p14:creationId xmlns="" xmlns:p14="http://schemas.microsoft.com/office/powerpoint/2010/main" val="1775200105"/>
       </p:ext>
     </p:extLst>
   </p:cSld>
@@ -1218,6 +1118,7 @@
           <a:p>
             <a:fld id="{E5A5E837-3E5E-4E9D-994C-F76C4A83F0EF}" type="slidenum">
               <a:rPr lang="en-US" smtClean="0"/>
+              <a:pPr/>
               <a:t>2</a:t>
             </a:fld>
             <a:endParaRPr lang="en-US"/>
@@ -1227,7 +1128,7 @@
     </p:spTree>
     <p:extLst>
       <p:ext uri="{BB962C8B-B14F-4D97-AF65-F5344CB8AC3E}">
-        <p14:creationId xmlns:p14="http://schemas.microsoft.com/office/powerpoint/2010/main" val="953220868"/>
+        <p14:creationId xmlns="" xmlns:p14="http://schemas.microsoft.com/office/powerpoint/2010/main" val="953220868"/>
       </p:ext>
     </p:extLst>
   </p:cSld>
@@ -1418,7 +1319,8 @@
           <a:p>
             <a:fld id="{7E7B0859-7E68-486B-91F8-7CE1EC896267}" type="datetimeFigureOut">
               <a:rPr lang="en-US" smtClean="0"/>
-              <a:t>5/1/2017</a:t>
+              <a:pPr/>
+              <a:t>5/3/2017</a:t>
             </a:fld>
             <a:endParaRPr lang="en-US"/>
           </a:p>
@@ -1460,6 +1362,7 @@
           <a:p>
             <a:fld id="{013EA0E2-7F64-4069-93AE-9BE6D9CFFC6E}" type="slidenum">
               <a:rPr lang="en-US" smtClean="0"/>
+              <a:pPr/>
               <a:t>‹#›</a:t>
             </a:fld>
             <a:endParaRPr lang="en-US"/>
@@ -1469,7 +1372,7 @@
     </p:spTree>
     <p:extLst>
       <p:ext uri="{BB962C8B-B14F-4D97-AF65-F5344CB8AC3E}">
-        <p14:creationId xmlns:p14="http://schemas.microsoft.com/office/powerpoint/2010/main" val="2996711325"/>
+        <p14:creationId xmlns="" xmlns:p14="http://schemas.microsoft.com/office/powerpoint/2010/main" val="2996711325"/>
       </p:ext>
     </p:extLst>
   </p:cSld>
@@ -1588,7 +1491,8 @@
           <a:p>
             <a:fld id="{7E7B0859-7E68-486B-91F8-7CE1EC896267}" type="datetimeFigureOut">
               <a:rPr lang="en-US" smtClean="0"/>
-              <a:t>5/1/2017</a:t>
+              <a:pPr/>
+              <a:t>5/3/2017</a:t>
             </a:fld>
             <a:endParaRPr lang="en-US"/>
           </a:p>
@@ -1630,6 +1534,7 @@
           <a:p>
             <a:fld id="{013EA0E2-7F64-4069-93AE-9BE6D9CFFC6E}" type="slidenum">
               <a:rPr lang="en-US" smtClean="0"/>
+              <a:pPr/>
               <a:t>‹#›</a:t>
             </a:fld>
             <a:endParaRPr lang="en-US"/>
@@ -1639,7 +1544,7 @@
     </p:spTree>
     <p:extLst>
       <p:ext uri="{BB962C8B-B14F-4D97-AF65-F5344CB8AC3E}">
-        <p14:creationId xmlns:p14="http://schemas.microsoft.com/office/powerpoint/2010/main" val="840349744"/>
+        <p14:creationId xmlns="" xmlns:p14="http://schemas.microsoft.com/office/powerpoint/2010/main" val="840349744"/>
       </p:ext>
     </p:extLst>
   </p:cSld>
@@ -1768,7 +1673,8 @@
           <a:p>
             <a:fld id="{7E7B0859-7E68-486B-91F8-7CE1EC896267}" type="datetimeFigureOut">
               <a:rPr lang="en-US" smtClean="0"/>
-              <a:t>5/1/2017</a:t>
+              <a:pPr/>
+              <a:t>5/3/2017</a:t>
             </a:fld>
             <a:endParaRPr lang="en-US"/>
           </a:p>
@@ -1810,6 +1716,7 @@
           <a:p>
             <a:fld id="{013EA0E2-7F64-4069-93AE-9BE6D9CFFC6E}" type="slidenum">
               <a:rPr lang="en-US" smtClean="0"/>
+              <a:pPr/>
               <a:t>‹#›</a:t>
             </a:fld>
             <a:endParaRPr lang="en-US"/>
@@ -1819,7 +1726,7 @@
     </p:spTree>
     <p:extLst>
       <p:ext uri="{BB962C8B-B14F-4D97-AF65-F5344CB8AC3E}">
-        <p14:creationId xmlns:p14="http://schemas.microsoft.com/office/powerpoint/2010/main" val="2238783529"/>
+        <p14:creationId xmlns="" xmlns:p14="http://schemas.microsoft.com/office/powerpoint/2010/main" val="2238783529"/>
       </p:ext>
     </p:extLst>
   </p:cSld>
@@ -1938,7 +1845,8 @@
           <a:p>
             <a:fld id="{7E7B0859-7E68-486B-91F8-7CE1EC896267}" type="datetimeFigureOut">
               <a:rPr lang="en-US" smtClean="0"/>
-              <a:t>5/1/2017</a:t>
+              <a:pPr/>
+              <a:t>5/3/2017</a:t>
             </a:fld>
             <a:endParaRPr lang="en-US"/>
           </a:p>
@@ -1980,6 +1888,7 @@
           <a:p>
             <a:fld id="{013EA0E2-7F64-4069-93AE-9BE6D9CFFC6E}" type="slidenum">
               <a:rPr lang="en-US" smtClean="0"/>
+              <a:pPr/>
               <a:t>‹#›</a:t>
             </a:fld>
             <a:endParaRPr lang="en-US"/>
@@ -1989,7 +1898,7 @@
     </p:spTree>
     <p:extLst>
       <p:ext uri="{BB962C8B-B14F-4D97-AF65-F5344CB8AC3E}">
-        <p14:creationId xmlns:p14="http://schemas.microsoft.com/office/powerpoint/2010/main" val="1366508319"/>
+        <p14:creationId xmlns="" xmlns:p14="http://schemas.microsoft.com/office/powerpoint/2010/main" val="1366508319"/>
       </p:ext>
     </p:extLst>
   </p:cSld>
@@ -2184,7 +2093,8 @@
           <a:p>
             <a:fld id="{7E7B0859-7E68-486B-91F8-7CE1EC896267}" type="datetimeFigureOut">
               <a:rPr lang="en-US" smtClean="0"/>
-              <a:t>5/1/2017</a:t>
+              <a:pPr/>
+              <a:t>5/3/2017</a:t>
             </a:fld>
             <a:endParaRPr lang="en-US"/>
           </a:p>
@@ -2226,6 +2136,7 @@
           <a:p>
             <a:fld id="{013EA0E2-7F64-4069-93AE-9BE6D9CFFC6E}" type="slidenum">
               <a:rPr lang="en-US" smtClean="0"/>
+              <a:pPr/>
               <a:t>‹#›</a:t>
             </a:fld>
             <a:endParaRPr lang="en-US"/>
@@ -2235,7 +2146,7 @@
     </p:spTree>
     <p:extLst>
       <p:ext uri="{BB962C8B-B14F-4D97-AF65-F5344CB8AC3E}">
-        <p14:creationId xmlns:p14="http://schemas.microsoft.com/office/powerpoint/2010/main" val="259851868"/>
+        <p14:creationId xmlns="" xmlns:p14="http://schemas.microsoft.com/office/powerpoint/2010/main" val="259851868"/>
       </p:ext>
     </p:extLst>
   </p:cSld>
@@ -2472,7 +2383,8 @@
           <a:p>
             <a:fld id="{7E7B0859-7E68-486B-91F8-7CE1EC896267}" type="datetimeFigureOut">
               <a:rPr lang="en-US" smtClean="0"/>
-              <a:t>5/1/2017</a:t>
+              <a:pPr/>
+              <a:t>5/3/2017</a:t>
             </a:fld>
             <a:endParaRPr lang="en-US"/>
           </a:p>
@@ -2514,6 +2426,7 @@
           <a:p>
             <a:fld id="{013EA0E2-7F64-4069-93AE-9BE6D9CFFC6E}" type="slidenum">
               <a:rPr lang="en-US" smtClean="0"/>
+              <a:pPr/>
               <a:t>‹#›</a:t>
             </a:fld>
             <a:endParaRPr lang="en-US"/>
@@ -2523,7 +2436,7 @@
     </p:spTree>
     <p:extLst>
       <p:ext uri="{BB962C8B-B14F-4D97-AF65-F5344CB8AC3E}">
-        <p14:creationId xmlns:p14="http://schemas.microsoft.com/office/powerpoint/2010/main" val="4098041436"/>
+        <p14:creationId xmlns="" xmlns:p14="http://schemas.microsoft.com/office/powerpoint/2010/main" val="4098041436"/>
       </p:ext>
     </p:extLst>
   </p:cSld>
@@ -2894,7 +2807,8 @@
           <a:p>
             <a:fld id="{7E7B0859-7E68-486B-91F8-7CE1EC896267}" type="datetimeFigureOut">
               <a:rPr lang="en-US" smtClean="0"/>
-              <a:t>5/1/2017</a:t>
+              <a:pPr/>
+              <a:t>5/3/2017</a:t>
             </a:fld>
             <a:endParaRPr lang="en-US"/>
           </a:p>
@@ -2936,6 +2850,7 @@
           <a:p>
             <a:fld id="{013EA0E2-7F64-4069-93AE-9BE6D9CFFC6E}" type="slidenum">
               <a:rPr lang="en-US" smtClean="0"/>
+              <a:pPr/>
               <a:t>‹#›</a:t>
             </a:fld>
             <a:endParaRPr lang="en-US"/>
@@ -2945,7 +2860,7 @@
     </p:spTree>
     <p:extLst>
       <p:ext uri="{BB962C8B-B14F-4D97-AF65-F5344CB8AC3E}">
-        <p14:creationId xmlns:p14="http://schemas.microsoft.com/office/powerpoint/2010/main" val="2131192979"/>
+        <p14:creationId xmlns="" xmlns:p14="http://schemas.microsoft.com/office/powerpoint/2010/main" val="2131192979"/>
       </p:ext>
     </p:extLst>
   </p:cSld>
@@ -3012,7 +2927,8 @@
           <a:p>
             <a:fld id="{7E7B0859-7E68-486B-91F8-7CE1EC896267}" type="datetimeFigureOut">
               <a:rPr lang="en-US" smtClean="0"/>
-              <a:t>5/1/2017</a:t>
+              <a:pPr/>
+              <a:t>5/3/2017</a:t>
             </a:fld>
             <a:endParaRPr lang="en-US"/>
           </a:p>
@@ -3054,6 +2970,7 @@
           <a:p>
             <a:fld id="{013EA0E2-7F64-4069-93AE-9BE6D9CFFC6E}" type="slidenum">
               <a:rPr lang="en-US" smtClean="0"/>
+              <a:pPr/>
               <a:t>‹#›</a:t>
             </a:fld>
             <a:endParaRPr lang="en-US"/>
@@ -3063,7 +2980,7 @@
     </p:spTree>
     <p:extLst>
       <p:ext uri="{BB962C8B-B14F-4D97-AF65-F5344CB8AC3E}">
-        <p14:creationId xmlns:p14="http://schemas.microsoft.com/office/powerpoint/2010/main" val="1599345176"/>
+        <p14:creationId xmlns="" xmlns:p14="http://schemas.microsoft.com/office/powerpoint/2010/main" val="1599345176"/>
       </p:ext>
     </p:extLst>
   </p:cSld>
@@ -3107,7 +3024,8 @@
           <a:p>
             <a:fld id="{7E7B0859-7E68-486B-91F8-7CE1EC896267}" type="datetimeFigureOut">
               <a:rPr lang="en-US" smtClean="0"/>
-              <a:t>5/1/2017</a:t>
+              <a:pPr/>
+              <a:t>5/3/2017</a:t>
             </a:fld>
             <a:endParaRPr lang="en-US"/>
           </a:p>
@@ -3149,6 +3067,7 @@
           <a:p>
             <a:fld id="{013EA0E2-7F64-4069-93AE-9BE6D9CFFC6E}" type="slidenum">
               <a:rPr lang="en-US" smtClean="0"/>
+              <a:pPr/>
               <a:t>‹#›</a:t>
             </a:fld>
             <a:endParaRPr lang="en-US"/>
@@ -3158,7 +3077,7 @@
     </p:spTree>
     <p:extLst>
       <p:ext uri="{BB962C8B-B14F-4D97-AF65-F5344CB8AC3E}">
-        <p14:creationId xmlns:p14="http://schemas.microsoft.com/office/powerpoint/2010/main" val="603415170"/>
+        <p14:creationId xmlns="" xmlns:p14="http://schemas.microsoft.com/office/powerpoint/2010/main" val="603415170"/>
       </p:ext>
     </p:extLst>
   </p:cSld>
@@ -3384,7 +3303,8 @@
           <a:p>
             <a:fld id="{7E7B0859-7E68-486B-91F8-7CE1EC896267}" type="datetimeFigureOut">
               <a:rPr lang="en-US" smtClean="0"/>
-              <a:t>5/1/2017</a:t>
+              <a:pPr/>
+              <a:t>5/3/2017</a:t>
             </a:fld>
             <a:endParaRPr lang="en-US"/>
           </a:p>
@@ -3426,6 +3346,7 @@
           <a:p>
             <a:fld id="{013EA0E2-7F64-4069-93AE-9BE6D9CFFC6E}" type="slidenum">
               <a:rPr lang="en-US" smtClean="0"/>
+              <a:pPr/>
               <a:t>‹#›</a:t>
             </a:fld>
             <a:endParaRPr lang="en-US"/>
@@ -3435,7 +3356,7 @@
     </p:spTree>
     <p:extLst>
       <p:ext uri="{BB962C8B-B14F-4D97-AF65-F5344CB8AC3E}">
-        <p14:creationId xmlns:p14="http://schemas.microsoft.com/office/powerpoint/2010/main" val="1675195140"/>
+        <p14:creationId xmlns="" xmlns:p14="http://schemas.microsoft.com/office/powerpoint/2010/main" val="1675195140"/>
       </p:ext>
     </p:extLst>
   </p:cSld>
@@ -3637,7 +3558,8 @@
           <a:p>
             <a:fld id="{7E7B0859-7E68-486B-91F8-7CE1EC896267}" type="datetimeFigureOut">
               <a:rPr lang="en-US" smtClean="0"/>
-              <a:t>5/1/2017</a:t>
+              <a:pPr/>
+              <a:t>5/3/2017</a:t>
             </a:fld>
             <a:endParaRPr lang="en-US"/>
           </a:p>
@@ -3679,6 +3601,7 @@
           <a:p>
             <a:fld id="{013EA0E2-7F64-4069-93AE-9BE6D9CFFC6E}" type="slidenum">
               <a:rPr lang="en-US" smtClean="0"/>
+              <a:pPr/>
               <a:t>‹#›</a:t>
             </a:fld>
             <a:endParaRPr lang="en-US"/>
@@ -3688,7 +3611,7 @@
     </p:spTree>
     <p:extLst>
       <p:ext uri="{BB962C8B-B14F-4D97-AF65-F5344CB8AC3E}">
-        <p14:creationId xmlns:p14="http://schemas.microsoft.com/office/powerpoint/2010/main" val="1127796673"/>
+        <p14:creationId xmlns="" xmlns:p14="http://schemas.microsoft.com/office/powerpoint/2010/main" val="1127796673"/>
       </p:ext>
     </p:extLst>
   </p:cSld>
@@ -3850,7 +3773,8 @@
           <a:p>
             <a:fld id="{7E7B0859-7E68-486B-91F8-7CE1EC896267}" type="datetimeFigureOut">
               <a:rPr lang="en-US" smtClean="0"/>
-              <a:t>5/1/2017</a:t>
+              <a:pPr/>
+              <a:t>5/3/2017</a:t>
             </a:fld>
             <a:endParaRPr lang="en-US"/>
           </a:p>
@@ -3928,6 +3852,7 @@
           <a:p>
             <a:fld id="{013EA0E2-7F64-4069-93AE-9BE6D9CFFC6E}" type="slidenum">
               <a:rPr lang="en-US" smtClean="0"/>
+              <a:pPr/>
               <a:t>‹#›</a:t>
             </a:fld>
             <a:endParaRPr lang="en-US"/>
@@ -3937,7 +3862,7 @@
     </p:spTree>
     <p:extLst>
       <p:ext uri="{BB962C8B-B14F-4D97-AF65-F5344CB8AC3E}">
-        <p14:creationId xmlns:p14="http://schemas.microsoft.com/office/powerpoint/2010/main" val="3185078485"/>
+        <p14:creationId xmlns="" xmlns:p14="http://schemas.microsoft.com/office/powerpoint/2010/main" val="3185078485"/>
       </p:ext>
     </p:extLst>
   </p:cSld>
@@ -4232,7 +4157,7 @@
           <p:nvPr>
             <p:extLst>
               <p:ext uri="{D42A27DB-BD31-4B8C-83A1-F6EECF244321}">
-                <p14:modId xmlns:p14="http://schemas.microsoft.com/office/powerpoint/2010/main" val="1523439344"/>
+                <p14:modId xmlns="" xmlns:p14="http://schemas.microsoft.com/office/powerpoint/2010/main" val="1523439344"/>
               </p:ext>
             </p:extLst>
           </p:nvPr>
@@ -4250,7 +4175,7 @@
     </p:spTree>
     <p:extLst>
       <p:ext uri="{BB962C8B-B14F-4D97-AF65-F5344CB8AC3E}">
-        <p14:creationId xmlns:p14="http://schemas.microsoft.com/office/powerpoint/2010/main" val="1108166496"/>
+        <p14:creationId xmlns="" xmlns:p14="http://schemas.microsoft.com/office/powerpoint/2010/main" val="1108166496"/>
       </p:ext>
     </p:extLst>
   </p:cSld>
@@ -4287,7 +4212,7 @@
             <p:ph idx="1"/>
             <p:extLst>
               <p:ext uri="{D42A27DB-BD31-4B8C-83A1-F6EECF244321}">
-                <p14:modId xmlns:p14="http://schemas.microsoft.com/office/powerpoint/2010/main" val="555933149"/>
+                <p14:modId xmlns="" xmlns:p14="http://schemas.microsoft.com/office/powerpoint/2010/main" val="555933149"/>
               </p:ext>
             </p:extLst>
           </p:nvPr>
@@ -4305,7 +4230,7 @@
     </p:spTree>
     <p:extLst>
       <p:ext uri="{BB962C8B-B14F-4D97-AF65-F5344CB8AC3E}">
-        <p14:creationId xmlns:p14="http://schemas.microsoft.com/office/powerpoint/2010/main" val="3849271558"/>
+        <p14:creationId xmlns="" xmlns:p14="http://schemas.microsoft.com/office/powerpoint/2010/main" val="3849271558"/>
       </p:ext>
     </p:extLst>
   </p:cSld>
@@ -4339,7 +4264,7 @@
           <p:nvPr>
             <p:extLst>
               <p:ext uri="{D42A27DB-BD31-4B8C-83A1-F6EECF244321}">
-                <p14:modId xmlns:p14="http://schemas.microsoft.com/office/powerpoint/2010/main" val="1527915868"/>
+                <p14:modId xmlns="" xmlns:p14="http://schemas.microsoft.com/office/powerpoint/2010/main" val="1527915868"/>
               </p:ext>
             </p:extLst>
           </p:nvPr>
@@ -4357,7 +4282,7 @@
     </p:spTree>
     <p:extLst>
       <p:ext uri="{BB962C8B-B14F-4D97-AF65-F5344CB8AC3E}">
-        <p14:creationId xmlns:p14="http://schemas.microsoft.com/office/powerpoint/2010/main" val="3130630920"/>
+        <p14:creationId xmlns="" xmlns:p14="http://schemas.microsoft.com/office/powerpoint/2010/main" val="3130630920"/>
       </p:ext>
     </p:extLst>
   </p:cSld>
@@ -4391,7 +4316,7 @@
           <p:nvPr>
             <p:extLst>
               <p:ext uri="{D42A27DB-BD31-4B8C-83A1-F6EECF244321}">
-                <p14:modId xmlns:p14="http://schemas.microsoft.com/office/powerpoint/2010/main" val="2196458566"/>
+                <p14:modId xmlns="" xmlns:p14="http://schemas.microsoft.com/office/powerpoint/2010/main" val="2196458566"/>
               </p:ext>
             </p:extLst>
           </p:nvPr>
@@ -4409,7 +4334,7 @@
     </p:spTree>
     <p:extLst>
       <p:ext uri="{BB962C8B-B14F-4D97-AF65-F5344CB8AC3E}">
-        <p14:creationId xmlns:p14="http://schemas.microsoft.com/office/powerpoint/2010/main" val="1137270798"/>
+        <p14:creationId xmlns="" xmlns:p14="http://schemas.microsoft.com/office/powerpoint/2010/main" val="1137270798"/>
       </p:ext>
     </p:extLst>
   </p:cSld>

</xml_diff>